<commit_message>
demo screenshot added and visualizations section filled out in intro
</commit_message>
<xml_diff>
--- a/Team_Presentation.pptx
+++ b/Team_Presentation.pptx
@@ -263,7 +263,7 @@
           <a:p>
             <a:fld id="{81EFE764-0BFB-2C4C-A007-F42C03CB572D}" type="datetimeFigureOut">
               <a:rPr lang="en-US" smtClean="0"/>
-              <a:t>7/15/23</a:t>
+              <a:t>7/17/23</a:t>
             </a:fld>
             <a:endParaRPr lang="en-US"/>
           </a:p>
@@ -461,7 +461,7 @@
           <a:p>
             <a:fld id="{81EFE764-0BFB-2C4C-A007-F42C03CB572D}" type="datetimeFigureOut">
               <a:rPr lang="en-US" smtClean="0"/>
-              <a:t>7/15/23</a:t>
+              <a:t>7/17/23</a:t>
             </a:fld>
             <a:endParaRPr lang="en-US"/>
           </a:p>
@@ -669,7 +669,7 @@
           <a:p>
             <a:fld id="{81EFE764-0BFB-2C4C-A007-F42C03CB572D}" type="datetimeFigureOut">
               <a:rPr lang="en-US" smtClean="0"/>
-              <a:t>7/15/23</a:t>
+              <a:t>7/17/23</a:t>
             </a:fld>
             <a:endParaRPr lang="en-US"/>
           </a:p>
@@ -867,7 +867,7 @@
           <a:p>
             <a:fld id="{81EFE764-0BFB-2C4C-A007-F42C03CB572D}" type="datetimeFigureOut">
               <a:rPr lang="en-US" smtClean="0"/>
-              <a:t>7/15/23</a:t>
+              <a:t>7/17/23</a:t>
             </a:fld>
             <a:endParaRPr lang="en-US"/>
           </a:p>
@@ -1142,7 +1142,7 @@
           <a:p>
             <a:fld id="{81EFE764-0BFB-2C4C-A007-F42C03CB572D}" type="datetimeFigureOut">
               <a:rPr lang="en-US" smtClean="0"/>
-              <a:t>7/15/23</a:t>
+              <a:t>7/17/23</a:t>
             </a:fld>
             <a:endParaRPr lang="en-US"/>
           </a:p>
@@ -1407,7 +1407,7 @@
           <a:p>
             <a:fld id="{81EFE764-0BFB-2C4C-A007-F42C03CB572D}" type="datetimeFigureOut">
               <a:rPr lang="en-US" smtClean="0"/>
-              <a:t>7/15/23</a:t>
+              <a:t>7/17/23</a:t>
             </a:fld>
             <a:endParaRPr lang="en-US"/>
           </a:p>
@@ -1819,7 +1819,7 @@
           <a:p>
             <a:fld id="{81EFE764-0BFB-2C4C-A007-F42C03CB572D}" type="datetimeFigureOut">
               <a:rPr lang="en-US" smtClean="0"/>
-              <a:t>7/15/23</a:t>
+              <a:t>7/17/23</a:t>
             </a:fld>
             <a:endParaRPr lang="en-US"/>
           </a:p>
@@ -1960,7 +1960,7 @@
           <a:p>
             <a:fld id="{81EFE764-0BFB-2C4C-A007-F42C03CB572D}" type="datetimeFigureOut">
               <a:rPr lang="en-US" smtClean="0"/>
-              <a:t>7/15/23</a:t>
+              <a:t>7/17/23</a:t>
             </a:fld>
             <a:endParaRPr lang="en-US"/>
           </a:p>
@@ -2073,7 +2073,7 @@
           <a:p>
             <a:fld id="{81EFE764-0BFB-2C4C-A007-F42C03CB572D}" type="datetimeFigureOut">
               <a:rPr lang="en-US" smtClean="0"/>
-              <a:t>7/15/23</a:t>
+              <a:t>7/17/23</a:t>
             </a:fld>
             <a:endParaRPr lang="en-US"/>
           </a:p>
@@ -2384,7 +2384,7 @@
           <a:p>
             <a:fld id="{81EFE764-0BFB-2C4C-A007-F42C03CB572D}" type="datetimeFigureOut">
               <a:rPr lang="en-US" smtClean="0"/>
-              <a:t>7/15/23</a:t>
+              <a:t>7/17/23</a:t>
             </a:fld>
             <a:endParaRPr lang="en-US"/>
           </a:p>
@@ -2672,7 +2672,7 @@
           <a:p>
             <a:fld id="{81EFE764-0BFB-2C4C-A007-F42C03CB572D}" type="datetimeFigureOut">
               <a:rPr lang="en-US" smtClean="0"/>
-              <a:t>7/15/23</a:t>
+              <a:t>7/17/23</a:t>
             </a:fld>
             <a:endParaRPr lang="en-US"/>
           </a:p>
@@ -2913,7 +2913,7 @@
           <a:p>
             <a:fld id="{81EFE764-0BFB-2C4C-A007-F42C03CB572D}" type="datetimeFigureOut">
               <a:rPr lang="en-US" smtClean="0"/>
-              <a:t>7/15/23</a:t>
+              <a:t>7/17/23</a:t>
             </a:fld>
             <a:endParaRPr lang="en-US"/>
           </a:p>
@@ -3577,7 +3577,7 @@
           <a:p>
             <a:r>
               <a:rPr lang="en-US" sz="2000" dirty="0"/>
-              <a:t>Visualizations do…</a:t>
+              <a:t>Visualizations prompt user input to compare two stocks through metrics, OHLC (open high low close) charts, and gauge charts</a:t>
             </a:r>
           </a:p>
           <a:p>
@@ -4989,8 +4989,8 @@
         </p:nvSpPr>
         <p:spPr>
           <a:xfrm>
-            <a:off x="8178230" y="1321356"/>
-            <a:ext cx="1901931" cy="369332"/>
+            <a:off x="359006" y="298174"/>
+            <a:ext cx="1589063" cy="307777"/>
           </a:xfrm>
           <a:prstGeom prst="rect">
             <a:avLst/>
@@ -5000,18 +5000,48 @@
           </a:solidFill>
         </p:spPr>
         <p:txBody>
-          <a:bodyPr wrap="none" rtlCol="0">
+          <a:bodyPr wrap="square" rtlCol="0">
             <a:spAutoFit/>
           </a:bodyPr>
           <a:lstStyle/>
           <a:p>
             <a:r>
-              <a:rPr lang="en-US" dirty="0"/>
+              <a:rPr lang="en-US" sz="1400" dirty="0"/>
               <a:t>Speaker: Montana</a:t>
             </a:r>
           </a:p>
         </p:txBody>
       </p:sp>
+      <p:pic>
+        <p:nvPicPr>
+          <p:cNvPr id="8" name="Picture 7" descr="A screenshot of a graph&#10;&#10;Description automatically generated">
+            <a:extLst>
+              <a:ext uri="{FF2B5EF4-FFF2-40B4-BE49-F238E27FC236}">
+                <a16:creationId xmlns:a16="http://schemas.microsoft.com/office/drawing/2014/main" id="{33F9911E-0EE6-573C-3DB2-8160ECFC86BE}"/>
+              </a:ext>
+            </a:extLst>
+          </p:cNvPr>
+          <p:cNvPicPr>
+            <a:picLocks noChangeAspect="1"/>
+          </p:cNvPicPr>
+          <p:nvPr/>
+        </p:nvPicPr>
+        <p:blipFill>
+          <a:blip r:embed="rId2"/>
+          <a:stretch>
+            <a:fillRect/>
+          </a:stretch>
+        </p:blipFill>
+        <p:spPr>
+          <a:xfrm>
+            <a:off x="5266908" y="241393"/>
+            <a:ext cx="6770975" cy="6375213"/>
+          </a:xfrm>
+          <a:prstGeom prst="rect">
+            <a:avLst/>
+          </a:prstGeom>
+        </p:spPr>
+      </p:pic>
     </p:spTree>
     <p:extLst>
       <p:ext uri="{BB962C8B-B14F-4D97-AF65-F5344CB8AC3E}">

</xml_diff>